<commit_message>
updates (clayton + slides)
</commit_message>
<xml_diff>
--- a/slides/GitHubIntro_2021.pptx
+++ b/slides/GitHubIntro_2021.pptx
@@ -218,7 +218,7 @@
           <a:p>
             <a:fld id="{282937C7-2935-0042-9D4A-82A40091BB27}" type="datetimeFigureOut">
               <a:rPr lang="en-US" smtClean="0"/>
-              <a:t>8/26/21</a:t>
+              <a:t>8/27/21</a:t>
             </a:fld>
             <a:endParaRPr lang="en-US"/>
           </a:p>
@@ -2416,7 +2416,7 @@
           <a:p>
             <a:fld id="{FC364BD7-7E38-4F49-AFF1-BE6F72DBA9D4}" type="datetimeFigureOut">
               <a:rPr lang="en-US" smtClean="0"/>
-              <a:t>8/26/21</a:t>
+              <a:t>8/27/21</a:t>
             </a:fld>
             <a:endParaRPr lang="en-US"/>
           </a:p>
@@ -2614,7 +2614,7 @@
           <a:p>
             <a:fld id="{FC364BD7-7E38-4F49-AFF1-BE6F72DBA9D4}" type="datetimeFigureOut">
               <a:rPr lang="en-US" smtClean="0"/>
-              <a:t>8/26/21</a:t>
+              <a:t>8/27/21</a:t>
             </a:fld>
             <a:endParaRPr lang="en-US"/>
           </a:p>
@@ -2822,7 +2822,7 @@
           <a:p>
             <a:fld id="{FC364BD7-7E38-4F49-AFF1-BE6F72DBA9D4}" type="datetimeFigureOut">
               <a:rPr lang="en-US" smtClean="0"/>
-              <a:t>8/26/21</a:t>
+              <a:t>8/27/21</a:t>
             </a:fld>
             <a:endParaRPr lang="en-US"/>
           </a:p>
@@ -3020,7 +3020,7 @@
           <a:p>
             <a:fld id="{FC364BD7-7E38-4F49-AFF1-BE6F72DBA9D4}" type="datetimeFigureOut">
               <a:rPr lang="en-US" smtClean="0"/>
-              <a:t>8/26/21</a:t>
+              <a:t>8/27/21</a:t>
             </a:fld>
             <a:endParaRPr lang="en-US"/>
           </a:p>
@@ -3295,7 +3295,7 @@
           <a:p>
             <a:fld id="{FC364BD7-7E38-4F49-AFF1-BE6F72DBA9D4}" type="datetimeFigureOut">
               <a:rPr lang="en-US" smtClean="0"/>
-              <a:t>8/26/21</a:t>
+              <a:t>8/27/21</a:t>
             </a:fld>
             <a:endParaRPr lang="en-US"/>
           </a:p>
@@ -3560,7 +3560,7 @@
           <a:p>
             <a:fld id="{FC364BD7-7E38-4F49-AFF1-BE6F72DBA9D4}" type="datetimeFigureOut">
               <a:rPr lang="en-US" smtClean="0"/>
-              <a:t>8/26/21</a:t>
+              <a:t>8/27/21</a:t>
             </a:fld>
             <a:endParaRPr lang="en-US"/>
           </a:p>
@@ -3972,7 +3972,7 @@
           <a:p>
             <a:fld id="{FC364BD7-7E38-4F49-AFF1-BE6F72DBA9D4}" type="datetimeFigureOut">
               <a:rPr lang="en-US" smtClean="0"/>
-              <a:t>8/26/21</a:t>
+              <a:t>8/27/21</a:t>
             </a:fld>
             <a:endParaRPr lang="en-US"/>
           </a:p>
@@ -4113,7 +4113,7 @@
           <a:p>
             <a:fld id="{FC364BD7-7E38-4F49-AFF1-BE6F72DBA9D4}" type="datetimeFigureOut">
               <a:rPr lang="en-US" smtClean="0"/>
-              <a:t>8/26/21</a:t>
+              <a:t>8/27/21</a:t>
             </a:fld>
             <a:endParaRPr lang="en-US"/>
           </a:p>
@@ -4226,7 +4226,7 @@
           <a:p>
             <a:fld id="{FC364BD7-7E38-4F49-AFF1-BE6F72DBA9D4}" type="datetimeFigureOut">
               <a:rPr lang="en-US" smtClean="0"/>
-              <a:t>8/26/21</a:t>
+              <a:t>8/27/21</a:t>
             </a:fld>
             <a:endParaRPr lang="en-US"/>
           </a:p>
@@ -4537,7 +4537,7 @@
           <a:p>
             <a:fld id="{FC364BD7-7E38-4F49-AFF1-BE6F72DBA9D4}" type="datetimeFigureOut">
               <a:rPr lang="en-US" smtClean="0"/>
-              <a:t>8/26/21</a:t>
+              <a:t>8/27/21</a:t>
             </a:fld>
             <a:endParaRPr lang="en-US"/>
           </a:p>
@@ -4825,7 +4825,7 @@
           <a:p>
             <a:fld id="{FC364BD7-7E38-4F49-AFF1-BE6F72DBA9D4}" type="datetimeFigureOut">
               <a:rPr lang="en-US" smtClean="0"/>
-              <a:t>8/26/21</a:t>
+              <a:t>8/27/21</a:t>
             </a:fld>
             <a:endParaRPr lang="en-US"/>
           </a:p>
@@ -5066,7 +5066,7 @@
           <a:p>
             <a:fld id="{FC364BD7-7E38-4F49-AFF1-BE6F72DBA9D4}" type="datetimeFigureOut">
               <a:rPr lang="en-US" smtClean="0"/>
-              <a:t>8/26/21</a:t>
+              <a:t>8/27/21</a:t>
             </a:fld>
             <a:endParaRPr lang="en-US"/>
           </a:p>
@@ -17333,7 +17333,9 @@
         </p:nvSpPr>
         <p:spPr/>
         <p:txBody>
-          <a:bodyPr/>
+          <a:bodyPr>
+            <a:normAutofit/>
+          </a:bodyPr>
           <a:lstStyle/>
           <a:p>
             <a:r>
@@ -17415,7 +17417,33 @@
                 <a:latin typeface="Arial" panose="020B0604020202020204" pitchFamily="34" charset="0"/>
                 <a:cs typeface="Arial" panose="020B0604020202020204" pitchFamily="34" charset="0"/>
               </a:rPr>
-              <a:t>GitHub tutorial – I’d recommend making a mock repository to understand the functioning of git/GitHub </a:t>
+              <a:t>GitHub tutorial – I’d recommend making a mock repository to understand the functioning of git/GitHub</a:t>
+            </a:r>
+          </a:p>
+          <a:p>
+            <a:r>
+              <a:rPr lang="en-US" dirty="0">
+                <a:latin typeface="Arial" panose="020B0604020202020204" pitchFamily="34" charset="0"/>
+                <a:cs typeface="Arial" panose="020B0604020202020204" pitchFamily="34" charset="0"/>
+                <a:hlinkClick r:id="rId6"/>
+              </a:rPr>
+              <a:t>https://github.com/ahof1704/INP_2021_Git_Intro</a:t>
+            </a:r>
+            <a:endParaRPr lang="en-US" dirty="0">
+              <a:latin typeface="Arial" panose="020B0604020202020204" pitchFamily="34" charset="0"/>
+              <a:cs typeface="Arial" panose="020B0604020202020204" pitchFamily="34" charset="0"/>
+            </a:endParaRPr>
+          </a:p>
+          <a:p>
+            <a:pPr marL="0" indent="0">
+              <a:buNone/>
+            </a:pPr>
+            <a:r>
+              <a:rPr lang="en-US" dirty="0">
+                <a:latin typeface="Arial" panose="020B0604020202020204" pitchFamily="34" charset="0"/>
+                <a:cs typeface="Arial" panose="020B0604020202020204" pitchFamily="34" charset="0"/>
+              </a:rPr>
+              <a:t>  Our tutorial specially made for you ❤️</a:t>
             </a:r>
           </a:p>
           <a:p>

</xml_diff>